<commit_message>
Commit from SJB, final images, notebook annotations, next draft of slides.
</commit_message>
<xml_diff>
--- a/reports/Project1_SJB_Draft1.pptx
+++ b/reports/Project1_SJB_Draft1.pptx
@@ -6,13 +6,13 @@
   </p:sldMasterIdLst>
   <p:sldIdLst>
     <p:sldId id="256" r:id="rId2"/>
-    <p:sldId id="257" r:id="rId3"/>
-    <p:sldId id="258" r:id="rId4"/>
-    <p:sldId id="259" r:id="rId5"/>
-    <p:sldId id="260" r:id="rId6"/>
-    <p:sldId id="261" r:id="rId7"/>
-    <p:sldId id="262" r:id="rId8"/>
-    <p:sldId id="263" r:id="rId9"/>
+    <p:sldId id="258" r:id="rId3"/>
+    <p:sldId id="259" r:id="rId4"/>
+    <p:sldId id="260" r:id="rId5"/>
+    <p:sldId id="261" r:id="rId6"/>
+    <p:sldId id="262" r:id="rId7"/>
+    <p:sldId id="263" r:id="rId8"/>
+    <p:sldId id="257" r:id="rId9"/>
   </p:sldIdLst>
   <p:sldSz cx="12192000" cy="6858000"/>
   <p:notesSz cx="6858000" cy="9144000"/>
@@ -841,7 +841,7 @@
           <a:p>
             <a:fld id="{51384DBF-0EE9-43E0-AA62-BFC7BE40CD54}" type="datetimeFigureOut">
               <a:rPr lang="en-US" smtClean="0"/>
-              <a:t>11/21/2019</a:t>
+              <a:t>11/22/2019</a:t>
             </a:fld>
             <a:endParaRPr lang="en-US"/>
           </a:p>
@@ -1092,7 +1092,7 @@
           <a:p>
             <a:fld id="{51384DBF-0EE9-43E0-AA62-BFC7BE40CD54}" type="datetimeFigureOut">
               <a:rPr lang="en-US" smtClean="0"/>
-              <a:t>11/21/2019</a:t>
+              <a:t>11/22/2019</a:t>
             </a:fld>
             <a:endParaRPr lang="en-US"/>
           </a:p>
@@ -1406,7 +1406,7 @@
           <a:p>
             <a:fld id="{51384DBF-0EE9-43E0-AA62-BFC7BE40CD54}" type="datetimeFigureOut">
               <a:rPr lang="en-US" smtClean="0"/>
-              <a:t>11/21/2019</a:t>
+              <a:t>11/22/2019</a:t>
             </a:fld>
             <a:endParaRPr lang="en-US"/>
           </a:p>
@@ -1747,7 +1747,7 @@
           <a:p>
             <a:fld id="{51384DBF-0EE9-43E0-AA62-BFC7BE40CD54}" type="datetimeFigureOut">
               <a:rPr lang="en-US" smtClean="0"/>
-              <a:t>11/21/2019</a:t>
+              <a:t>11/22/2019</a:t>
             </a:fld>
             <a:endParaRPr lang="en-US"/>
           </a:p>
@@ -2061,7 +2061,7 @@
           <a:p>
             <a:fld id="{51384DBF-0EE9-43E0-AA62-BFC7BE40CD54}" type="datetimeFigureOut">
               <a:rPr lang="en-US" smtClean="0"/>
-              <a:t>11/21/2019</a:t>
+              <a:t>11/22/2019</a:t>
             </a:fld>
             <a:endParaRPr lang="en-US"/>
           </a:p>
@@ -2454,7 +2454,7 @@
           <a:p>
             <a:fld id="{51384DBF-0EE9-43E0-AA62-BFC7BE40CD54}" type="datetimeFigureOut">
               <a:rPr lang="en-US" smtClean="0"/>
-              <a:t>11/21/2019</a:t>
+              <a:t>11/22/2019</a:t>
             </a:fld>
             <a:endParaRPr lang="en-US"/>
           </a:p>
@@ -2624,7 +2624,7 @@
           <a:p>
             <a:fld id="{51384DBF-0EE9-43E0-AA62-BFC7BE40CD54}" type="datetimeFigureOut">
               <a:rPr lang="en-US" smtClean="0"/>
-              <a:t>11/21/2019</a:t>
+              <a:t>11/22/2019</a:t>
             </a:fld>
             <a:endParaRPr lang="en-US"/>
           </a:p>
@@ -2804,7 +2804,7 @@
           <a:p>
             <a:fld id="{51384DBF-0EE9-43E0-AA62-BFC7BE40CD54}" type="datetimeFigureOut">
               <a:rPr lang="en-US" smtClean="0"/>
-              <a:t>11/21/2019</a:t>
+              <a:t>11/22/2019</a:t>
             </a:fld>
             <a:endParaRPr lang="en-US"/>
           </a:p>
@@ -2980,7 +2980,7 @@
           <a:p>
             <a:fld id="{51384DBF-0EE9-43E0-AA62-BFC7BE40CD54}" type="datetimeFigureOut">
               <a:rPr lang="en-US" smtClean="0"/>
-              <a:t>11/21/2019</a:t>
+              <a:t>11/22/2019</a:t>
             </a:fld>
             <a:endParaRPr lang="en-US"/>
           </a:p>
@@ -3227,7 +3227,7 @@
           <a:p>
             <a:fld id="{51384DBF-0EE9-43E0-AA62-BFC7BE40CD54}" type="datetimeFigureOut">
               <a:rPr lang="en-US" smtClean="0"/>
-              <a:t>11/21/2019</a:t>
+              <a:t>11/22/2019</a:t>
             </a:fld>
             <a:endParaRPr lang="en-US"/>
           </a:p>
@@ -3459,7 +3459,7 @@
           <a:p>
             <a:fld id="{51384DBF-0EE9-43E0-AA62-BFC7BE40CD54}" type="datetimeFigureOut">
               <a:rPr lang="en-US" smtClean="0"/>
-              <a:t>11/21/2019</a:t>
+              <a:t>11/22/2019</a:t>
             </a:fld>
             <a:endParaRPr lang="en-US"/>
           </a:p>
@@ -3833,7 +3833,7 @@
           <a:p>
             <a:fld id="{51384DBF-0EE9-43E0-AA62-BFC7BE40CD54}" type="datetimeFigureOut">
               <a:rPr lang="en-US" smtClean="0"/>
-              <a:t>11/21/2019</a:t>
+              <a:t>11/22/2019</a:t>
             </a:fld>
             <a:endParaRPr lang="en-US"/>
           </a:p>
@@ -3956,7 +3956,7 @@
           <a:p>
             <a:fld id="{51384DBF-0EE9-43E0-AA62-BFC7BE40CD54}" type="datetimeFigureOut">
               <a:rPr lang="en-US" smtClean="0"/>
-              <a:t>11/21/2019</a:t>
+              <a:t>11/22/2019</a:t>
             </a:fld>
             <a:endParaRPr lang="en-US"/>
           </a:p>
@@ -4051,7 +4051,7 @@
           <a:p>
             <a:fld id="{51384DBF-0EE9-43E0-AA62-BFC7BE40CD54}" type="datetimeFigureOut">
               <a:rPr lang="en-US" smtClean="0"/>
-              <a:t>11/21/2019</a:t>
+              <a:t>11/22/2019</a:t>
             </a:fld>
             <a:endParaRPr lang="en-US"/>
           </a:p>
@@ -4306,7 +4306,7 @@
           <a:p>
             <a:fld id="{51384DBF-0EE9-43E0-AA62-BFC7BE40CD54}" type="datetimeFigureOut">
               <a:rPr lang="en-US" smtClean="0"/>
-              <a:t>11/21/2019</a:t>
+              <a:t>11/22/2019</a:t>
             </a:fld>
             <a:endParaRPr lang="en-US"/>
           </a:p>
@@ -4569,7 +4569,7 @@
           <a:p>
             <a:fld id="{51384DBF-0EE9-43E0-AA62-BFC7BE40CD54}" type="datetimeFigureOut">
               <a:rPr lang="en-US" smtClean="0"/>
-              <a:t>11/21/2019</a:t>
+              <a:t>11/22/2019</a:t>
             </a:fld>
             <a:endParaRPr lang="en-US"/>
           </a:p>
@@ -5312,7 +5312,7 @@
           <a:p>
             <a:fld id="{51384DBF-0EE9-43E0-AA62-BFC7BE40CD54}" type="datetimeFigureOut">
               <a:rPr lang="en-US" smtClean="0"/>
-              <a:t>11/21/2019</a:t>
+              <a:t>11/22/2019</a:t>
             </a:fld>
             <a:endParaRPr lang="en-US"/>
           </a:p>
@@ -5902,7 +5902,7 @@
           <a:p>
             <a:pPr algn="ctr"/>
             <a:r>
-              <a:rPr lang="en-US" sz="4400" b="1" dirty="0" smtClean="0">
+              <a:rPr lang="en-US" sz="4400" b="1" u="sng" dirty="0" smtClean="0">
                 <a:latin typeface="Arial" panose="020B0604020202020204" pitchFamily="34" charset="0"/>
                 <a:cs typeface="Arial" panose="020B0604020202020204" pitchFamily="34" charset="0"/>
               </a:rPr>
@@ -5998,6 +5998,660 @@
 </file>
 
 <file path=ppt/slides/slide2.xml><?xml version="1.0" encoding="utf-8"?>
+<p:sld xmlns:a="http://schemas.openxmlformats.org/drawingml/2006/main" xmlns:r="http://schemas.openxmlformats.org/officeDocument/2006/relationships" xmlns:p="http://schemas.openxmlformats.org/presentationml/2006/main">
+  <p:cSld>
+    <p:spTree>
+      <p:nvGrpSpPr>
+        <p:cNvPr id="1" name=""/>
+        <p:cNvGrpSpPr/>
+        <p:nvPr/>
+      </p:nvGrpSpPr>
+      <p:grpSpPr>
+        <a:xfrm>
+          <a:off x="0" y="0"/>
+          <a:ext cx="0" cy="0"/>
+          <a:chOff x="0" y="0"/>
+          <a:chExt cx="0" cy="0"/>
+        </a:xfrm>
+      </p:grpSpPr>
+      <p:sp>
+        <p:nvSpPr>
+          <p:cNvPr id="5" name="TextBox 4"/>
+          <p:cNvSpPr txBox="1"/>
+          <p:nvPr/>
+        </p:nvSpPr>
+        <p:spPr>
+          <a:xfrm>
+            <a:off x="280658" y="592893"/>
+            <a:ext cx="11669916" cy="5693866"/>
+          </a:xfrm>
+          <a:prstGeom prst="rect">
+            <a:avLst/>
+          </a:prstGeom>
+          <a:noFill/>
+        </p:spPr>
+        <p:txBody>
+          <a:bodyPr wrap="square" rtlCol="0">
+            <a:spAutoFit/>
+          </a:bodyPr>
+          <a:lstStyle/>
+          <a:p>
+            <a:pPr algn="ctr"/>
+            <a:r>
+              <a:rPr lang="en-US" sz="4400" b="1" dirty="0" smtClean="0">
+                <a:latin typeface="Arial" panose="020B0604020202020204" pitchFamily="34" charset="0"/>
+                <a:cs typeface="Arial" panose="020B0604020202020204" pitchFamily="34" charset="0"/>
+              </a:rPr>
+              <a:t>Charter Schools and Education Reform</a:t>
+            </a:r>
+          </a:p>
+          <a:p>
+            <a:pPr algn="ctr"/>
+            <a:endParaRPr lang="en-US" sz="4000" dirty="0">
+              <a:latin typeface="Arial" panose="020B0604020202020204" pitchFamily="34" charset="0"/>
+              <a:cs typeface="Arial" panose="020B0604020202020204" pitchFamily="34" charset="0"/>
+            </a:endParaRPr>
+          </a:p>
+          <a:p>
+            <a:pPr algn="ctr"/>
+            <a:r>
+              <a:rPr lang="en-US" sz="3600" dirty="0" smtClean="0">
+                <a:latin typeface="Arial" panose="020B0604020202020204" pitchFamily="34" charset="0"/>
+                <a:cs typeface="Arial" panose="020B0604020202020204" pitchFamily="34" charset="0"/>
+              </a:rPr>
+              <a:t>Accountability</a:t>
+            </a:r>
+          </a:p>
+          <a:p>
+            <a:pPr algn="ctr"/>
+            <a:r>
+              <a:rPr lang="en-US" sz="2800" dirty="0" smtClean="0">
+                <a:latin typeface="Arial" panose="020B0604020202020204" pitchFamily="34" charset="0"/>
+                <a:cs typeface="Arial" panose="020B0604020202020204" pitchFamily="34" charset="0"/>
+              </a:rPr>
+              <a:t>Rapid evaluation if it doesn’t work.</a:t>
+            </a:r>
+            <a:endParaRPr lang="en-US" sz="2400" dirty="0" smtClean="0">
+              <a:latin typeface="Arial" panose="020B0604020202020204" pitchFamily="34" charset="0"/>
+              <a:cs typeface="Arial" panose="020B0604020202020204" pitchFamily="34" charset="0"/>
+            </a:endParaRPr>
+          </a:p>
+          <a:p>
+            <a:pPr algn="ctr"/>
+            <a:endParaRPr lang="en-US" sz="4000" dirty="0">
+              <a:latin typeface="Arial" panose="020B0604020202020204" pitchFamily="34" charset="0"/>
+              <a:cs typeface="Arial" panose="020B0604020202020204" pitchFamily="34" charset="0"/>
+            </a:endParaRPr>
+          </a:p>
+          <a:p>
+            <a:pPr algn="ctr"/>
+            <a:r>
+              <a:rPr lang="en-US" sz="3600" dirty="0" smtClean="0">
+                <a:latin typeface="Arial" panose="020B0604020202020204" pitchFamily="34" charset="0"/>
+                <a:cs typeface="Arial" panose="020B0604020202020204" pitchFamily="34" charset="0"/>
+              </a:rPr>
+              <a:t>Choice</a:t>
+            </a:r>
+          </a:p>
+          <a:p>
+            <a:pPr algn="ctr"/>
+            <a:r>
+              <a:rPr lang="en-US" sz="2800" dirty="0" smtClean="0">
+                <a:latin typeface="Arial" panose="020B0604020202020204" pitchFamily="34" charset="0"/>
+                <a:cs typeface="Arial" panose="020B0604020202020204" pitchFamily="34" charset="0"/>
+              </a:rPr>
+              <a:t>Parents dictate where to send their children.</a:t>
+            </a:r>
+          </a:p>
+          <a:p>
+            <a:pPr algn="ctr"/>
+            <a:endParaRPr lang="en-US" sz="4000" dirty="0">
+              <a:latin typeface="Arial" panose="020B0604020202020204" pitchFamily="34" charset="0"/>
+              <a:cs typeface="Arial" panose="020B0604020202020204" pitchFamily="34" charset="0"/>
+            </a:endParaRPr>
+          </a:p>
+          <a:p>
+            <a:pPr algn="ctr"/>
+            <a:r>
+              <a:rPr lang="en-US" sz="3600" dirty="0" smtClean="0">
+                <a:latin typeface="Arial" panose="020B0604020202020204" pitchFamily="34" charset="0"/>
+                <a:cs typeface="Arial" panose="020B0604020202020204" pitchFamily="34" charset="0"/>
+              </a:rPr>
+              <a:t>Autonomy</a:t>
+            </a:r>
+          </a:p>
+          <a:p>
+            <a:pPr algn="ctr"/>
+            <a:r>
+              <a:rPr lang="en-US" sz="2800" dirty="0" smtClean="0">
+                <a:latin typeface="Arial" panose="020B0604020202020204" pitchFamily="34" charset="0"/>
+                <a:cs typeface="Arial" panose="020B0604020202020204" pitchFamily="34" charset="0"/>
+              </a:rPr>
+              <a:t>Entrepreneurial and innovative.</a:t>
+            </a:r>
+          </a:p>
+        </p:txBody>
+      </p:sp>
+    </p:spTree>
+    <p:extLst>
+      <p:ext uri="{BB962C8B-B14F-4D97-AF65-F5344CB8AC3E}">
+        <p14:creationId xmlns:p14="http://schemas.microsoft.com/office/powerpoint/2010/main" val="3992222410"/>
+      </p:ext>
+    </p:extLst>
+  </p:cSld>
+  <p:clrMapOvr>
+    <a:masterClrMapping/>
+  </p:clrMapOvr>
+  <p:timing>
+    <p:tnLst>
+      <p:par>
+        <p:cTn id="1" dur="indefinite" restart="never" nodeType="tmRoot"/>
+      </p:par>
+    </p:tnLst>
+  </p:timing>
+</p:sld>
+</file>
+
+<file path=ppt/slides/slide3.xml><?xml version="1.0" encoding="utf-8"?>
+<p:sld xmlns:a="http://schemas.openxmlformats.org/drawingml/2006/main" xmlns:r="http://schemas.openxmlformats.org/officeDocument/2006/relationships" xmlns:p="http://schemas.openxmlformats.org/presentationml/2006/main">
+  <p:cSld>
+    <p:spTree>
+      <p:nvGrpSpPr>
+        <p:cNvPr id="1" name=""/>
+        <p:cNvGrpSpPr/>
+        <p:nvPr/>
+      </p:nvGrpSpPr>
+      <p:grpSpPr>
+        <a:xfrm>
+          <a:off x="0" y="0"/>
+          <a:ext cx="0" cy="0"/>
+          <a:chOff x="0" y="0"/>
+          <a:chExt cx="0" cy="0"/>
+        </a:xfrm>
+      </p:grpSpPr>
+      <p:sp>
+        <p:nvSpPr>
+          <p:cNvPr id="4" name="TextBox 3"/>
+          <p:cNvSpPr txBox="1"/>
+          <p:nvPr/>
+        </p:nvSpPr>
+        <p:spPr>
+          <a:xfrm>
+            <a:off x="280658" y="440489"/>
+            <a:ext cx="11669916" cy="6186309"/>
+          </a:xfrm>
+          <a:prstGeom prst="rect">
+            <a:avLst/>
+          </a:prstGeom>
+          <a:noFill/>
+        </p:spPr>
+        <p:txBody>
+          <a:bodyPr wrap="square" rtlCol="0">
+            <a:spAutoFit/>
+          </a:bodyPr>
+          <a:lstStyle/>
+          <a:p>
+            <a:pPr algn="ctr"/>
+            <a:r>
+              <a:rPr lang="en-US" sz="4400" b="1" dirty="0" smtClean="0">
+                <a:latin typeface="Arial" panose="020B0604020202020204" pitchFamily="34" charset="0"/>
+                <a:cs typeface="Arial" panose="020B0604020202020204" pitchFamily="34" charset="0"/>
+              </a:rPr>
+              <a:t>But Only if the Schools Work! </a:t>
+            </a:r>
+          </a:p>
+          <a:p>
+            <a:pPr algn="ctr"/>
+            <a:r>
+              <a:rPr lang="en-US" sz="3600" dirty="0" smtClean="0">
+                <a:latin typeface="Arial" panose="020B0604020202020204" pitchFamily="34" charset="0"/>
+                <a:cs typeface="Arial" panose="020B0604020202020204" pitchFamily="34" charset="0"/>
+              </a:rPr>
+              <a:t>The Dataset: 2019 Math STAAR Test</a:t>
+            </a:r>
+          </a:p>
+          <a:p>
+            <a:pPr algn="ctr"/>
+            <a:endParaRPr lang="en-US" sz="4000" dirty="0">
+              <a:latin typeface="Arial" panose="020B0604020202020204" pitchFamily="34" charset="0"/>
+              <a:cs typeface="Arial" panose="020B0604020202020204" pitchFamily="34" charset="0"/>
+            </a:endParaRPr>
+          </a:p>
+          <a:p>
+            <a:pPr algn="ctr"/>
+            <a:r>
+              <a:rPr lang="en-US" sz="2800" dirty="0" smtClean="0">
+                <a:latin typeface="Arial" panose="020B0604020202020204" pitchFamily="34" charset="0"/>
+                <a:cs typeface="Arial" panose="020B0604020202020204" pitchFamily="34" charset="0"/>
+              </a:rPr>
+              <a:t>Texas Assessment of Academic Readiness (STAAR) Test 2019</a:t>
+            </a:r>
+          </a:p>
+          <a:p>
+            <a:pPr algn="ctr"/>
+            <a:endParaRPr lang="en-US" sz="2800" dirty="0">
+              <a:latin typeface="Arial" panose="020B0604020202020204" pitchFamily="34" charset="0"/>
+              <a:cs typeface="Arial" panose="020B0604020202020204" pitchFamily="34" charset="0"/>
+            </a:endParaRPr>
+          </a:p>
+          <a:p>
+            <a:pPr algn="ctr"/>
+            <a:r>
+              <a:rPr lang="en-US" sz="2800" dirty="0" smtClean="0">
+                <a:latin typeface="Arial" panose="020B0604020202020204" pitchFamily="34" charset="0"/>
+                <a:cs typeface="Arial" panose="020B0604020202020204" pitchFamily="34" charset="0"/>
+              </a:rPr>
+              <a:t>Administered to all public schools (ISD and Charter) at the same time and under similar conditions (N&gt;4000 schools)</a:t>
+            </a:r>
+          </a:p>
+          <a:p>
+            <a:pPr algn="ctr"/>
+            <a:endParaRPr lang="en-US" sz="2800" dirty="0" smtClean="0">
+              <a:latin typeface="Arial" panose="020B0604020202020204" pitchFamily="34" charset="0"/>
+              <a:cs typeface="Arial" panose="020B0604020202020204" pitchFamily="34" charset="0"/>
+            </a:endParaRPr>
+          </a:p>
+          <a:p>
+            <a:pPr algn="ctr"/>
+            <a:r>
+              <a:rPr lang="en-US" sz="2800" dirty="0" smtClean="0">
+                <a:latin typeface="Arial" panose="020B0604020202020204" pitchFamily="34" charset="0"/>
+                <a:cs typeface="Arial" panose="020B0604020202020204" pitchFamily="34" charset="0"/>
+              </a:rPr>
+              <a:t>Large dataset (#schools, demographics, geographical, socioeconomic, immigrant status, much more!)</a:t>
+            </a:r>
+          </a:p>
+          <a:p>
+            <a:pPr algn="ctr"/>
+            <a:endParaRPr lang="en-US" sz="2800" dirty="0">
+              <a:latin typeface="Arial" panose="020B0604020202020204" pitchFamily="34" charset="0"/>
+              <a:cs typeface="Arial" panose="020B0604020202020204" pitchFamily="34" charset="0"/>
+            </a:endParaRPr>
+          </a:p>
+          <a:p>
+            <a:pPr algn="ctr"/>
+            <a:r>
+              <a:rPr lang="en-US" sz="3200" b="1" dirty="0" smtClean="0">
+                <a:latin typeface="Arial" panose="020B0604020202020204" pitchFamily="34" charset="0"/>
+                <a:cs typeface="Arial" panose="020B0604020202020204" pitchFamily="34" charset="0"/>
+              </a:rPr>
+              <a:t>CAVEATS: Only one standardized test, Grades 3-5! </a:t>
+            </a:r>
+            <a:endParaRPr lang="en-US" sz="3200" b="1" dirty="0">
+              <a:latin typeface="Arial" panose="020B0604020202020204" pitchFamily="34" charset="0"/>
+              <a:cs typeface="Arial" panose="020B0604020202020204" pitchFamily="34" charset="0"/>
+            </a:endParaRPr>
+          </a:p>
+          <a:p>
+            <a:pPr algn="ctr"/>
+            <a:endParaRPr lang="en-US" sz="2000" b="1" dirty="0" smtClean="0">
+              <a:latin typeface="Arial" panose="020B0604020202020204" pitchFamily="34" charset="0"/>
+              <a:cs typeface="Arial" panose="020B0604020202020204" pitchFamily="34" charset="0"/>
+            </a:endParaRPr>
+          </a:p>
+        </p:txBody>
+      </p:sp>
+    </p:spTree>
+    <p:extLst>
+      <p:ext uri="{BB962C8B-B14F-4D97-AF65-F5344CB8AC3E}">
+        <p14:creationId xmlns:p14="http://schemas.microsoft.com/office/powerpoint/2010/main" val="3215726998"/>
+      </p:ext>
+    </p:extLst>
+  </p:cSld>
+  <p:clrMapOvr>
+    <a:masterClrMapping/>
+  </p:clrMapOvr>
+</p:sld>
+</file>
+
+<file path=ppt/slides/slide4.xml><?xml version="1.0" encoding="utf-8"?>
+<p:sld xmlns:a="http://schemas.openxmlformats.org/drawingml/2006/main" xmlns:r="http://schemas.openxmlformats.org/officeDocument/2006/relationships" xmlns:p="http://schemas.openxmlformats.org/presentationml/2006/main">
+  <p:cSld>
+    <p:spTree>
+      <p:nvGrpSpPr>
+        <p:cNvPr id="1" name=""/>
+        <p:cNvGrpSpPr/>
+        <p:nvPr/>
+      </p:nvGrpSpPr>
+      <p:grpSpPr>
+        <a:xfrm>
+          <a:off x="0" y="0"/>
+          <a:ext cx="0" cy="0"/>
+          <a:chOff x="0" y="0"/>
+          <a:chExt cx="0" cy="0"/>
+        </a:xfrm>
+      </p:grpSpPr>
+      <p:pic>
+        <p:nvPicPr>
+          <p:cNvPr id="2" name="Picture 1"/>
+          <p:cNvPicPr>
+            <a:picLocks noChangeAspect="1"/>
+          </p:cNvPicPr>
+          <p:nvPr/>
+        </p:nvPicPr>
+        <p:blipFill>
+          <a:blip r:embed="rId2" cstate="print">
+            <a:extLst>
+              <a:ext uri="{28A0092B-C50C-407E-A947-70E740481C1C}">
+                <a14:useLocalDpi xmlns:a14="http://schemas.microsoft.com/office/drawing/2010/main" val="0"/>
+              </a:ext>
+            </a:extLst>
+          </a:blip>
+          <a:stretch>
+            <a:fillRect/>
+          </a:stretch>
+        </p:blipFill>
+        <p:spPr>
+          <a:xfrm>
+            <a:off x="1075765" y="94133"/>
+            <a:ext cx="10031506" cy="6687670"/>
+          </a:xfrm>
+          <a:prstGeom prst="rect">
+            <a:avLst/>
+          </a:prstGeom>
+        </p:spPr>
+      </p:pic>
+    </p:spTree>
+    <p:extLst>
+      <p:ext uri="{BB962C8B-B14F-4D97-AF65-F5344CB8AC3E}">
+        <p14:creationId xmlns:p14="http://schemas.microsoft.com/office/powerpoint/2010/main" val="3110368016"/>
+      </p:ext>
+    </p:extLst>
+  </p:cSld>
+  <p:clrMapOvr>
+    <a:masterClrMapping/>
+  </p:clrMapOvr>
+</p:sld>
+</file>
+
+<file path=ppt/slides/slide5.xml><?xml version="1.0" encoding="utf-8"?>
+<p:sld xmlns:a="http://schemas.openxmlformats.org/drawingml/2006/main" xmlns:r="http://schemas.openxmlformats.org/officeDocument/2006/relationships" xmlns:p="http://schemas.openxmlformats.org/presentationml/2006/main">
+  <p:cSld>
+    <p:spTree>
+      <p:nvGrpSpPr>
+        <p:cNvPr id="1" name=""/>
+        <p:cNvGrpSpPr/>
+        <p:nvPr/>
+      </p:nvGrpSpPr>
+      <p:grpSpPr>
+        <a:xfrm>
+          <a:off x="0" y="0"/>
+          <a:ext cx="0" cy="0"/>
+          <a:chOff x="0" y="0"/>
+          <a:chExt cx="0" cy="0"/>
+        </a:xfrm>
+      </p:grpSpPr>
+      <p:pic>
+        <p:nvPicPr>
+          <p:cNvPr id="2" name="Picture 1"/>
+          <p:cNvPicPr>
+            <a:picLocks noChangeAspect="1"/>
+          </p:cNvPicPr>
+          <p:nvPr/>
+        </p:nvPicPr>
+        <p:blipFill>
+          <a:blip r:embed="rId2" cstate="print">
+            <a:extLst>
+              <a:ext uri="{28A0092B-C50C-407E-A947-70E740481C1C}">
+                <a14:useLocalDpi xmlns:a14="http://schemas.microsoft.com/office/drawing/2010/main" val="0"/>
+              </a:ext>
+            </a:extLst>
+          </a:blip>
+          <a:stretch>
+            <a:fillRect/>
+          </a:stretch>
+        </p:blipFill>
+        <p:spPr>
+          <a:xfrm>
+            <a:off x="1093694" y="94129"/>
+            <a:ext cx="10000130" cy="6666753"/>
+          </a:xfrm>
+          <a:prstGeom prst="rect">
+            <a:avLst/>
+          </a:prstGeom>
+        </p:spPr>
+      </p:pic>
+    </p:spTree>
+    <p:extLst>
+      <p:ext uri="{BB962C8B-B14F-4D97-AF65-F5344CB8AC3E}">
+        <p14:creationId xmlns:p14="http://schemas.microsoft.com/office/powerpoint/2010/main" val="1900293336"/>
+      </p:ext>
+    </p:extLst>
+  </p:cSld>
+  <p:clrMapOvr>
+    <a:masterClrMapping/>
+  </p:clrMapOvr>
+</p:sld>
+</file>
+
+<file path=ppt/slides/slide6.xml><?xml version="1.0" encoding="utf-8"?>
+<p:sld xmlns:a="http://schemas.openxmlformats.org/drawingml/2006/main" xmlns:r="http://schemas.openxmlformats.org/officeDocument/2006/relationships" xmlns:p="http://schemas.openxmlformats.org/presentationml/2006/main">
+  <p:cSld>
+    <p:spTree>
+      <p:nvGrpSpPr>
+        <p:cNvPr id="1" name=""/>
+        <p:cNvGrpSpPr/>
+        <p:nvPr/>
+      </p:nvGrpSpPr>
+      <p:grpSpPr>
+        <a:xfrm>
+          <a:off x="0" y="0"/>
+          <a:ext cx="0" cy="0"/>
+          <a:chOff x="0" y="0"/>
+          <a:chExt cx="0" cy="0"/>
+        </a:xfrm>
+      </p:grpSpPr>
+      <p:pic>
+        <p:nvPicPr>
+          <p:cNvPr id="2" name="Picture 1"/>
+          <p:cNvPicPr>
+            <a:picLocks noChangeAspect="1"/>
+          </p:cNvPicPr>
+          <p:nvPr/>
+        </p:nvPicPr>
+        <p:blipFill>
+          <a:blip r:embed="rId2" cstate="print">
+            <a:extLst>
+              <a:ext uri="{28A0092B-C50C-407E-A947-70E740481C1C}">
+                <a14:useLocalDpi xmlns:a14="http://schemas.microsoft.com/office/drawing/2010/main" val="0"/>
+              </a:ext>
+            </a:extLst>
+          </a:blip>
+          <a:stretch>
+            <a:fillRect/>
+          </a:stretch>
+        </p:blipFill>
+        <p:spPr>
+          <a:xfrm>
+            <a:off x="1223685" y="212164"/>
+            <a:ext cx="9789456" cy="6526304"/>
+          </a:xfrm>
+          <a:prstGeom prst="rect">
+            <a:avLst/>
+          </a:prstGeom>
+        </p:spPr>
+      </p:pic>
+    </p:spTree>
+    <p:extLst>
+      <p:ext uri="{BB962C8B-B14F-4D97-AF65-F5344CB8AC3E}">
+        <p14:creationId xmlns:p14="http://schemas.microsoft.com/office/powerpoint/2010/main" val="342704038"/>
+      </p:ext>
+    </p:extLst>
+  </p:cSld>
+  <p:clrMapOvr>
+    <a:masterClrMapping/>
+  </p:clrMapOvr>
+</p:sld>
+</file>
+
+<file path=ppt/slides/slide7.xml><?xml version="1.0" encoding="utf-8"?>
+<p:sld xmlns:a="http://schemas.openxmlformats.org/drawingml/2006/main" xmlns:r="http://schemas.openxmlformats.org/officeDocument/2006/relationships" xmlns:p="http://schemas.openxmlformats.org/presentationml/2006/main">
+  <p:cSld>
+    <p:spTree>
+      <p:nvGrpSpPr>
+        <p:cNvPr id="1" name=""/>
+        <p:cNvGrpSpPr/>
+        <p:nvPr/>
+      </p:nvGrpSpPr>
+      <p:grpSpPr>
+        <a:xfrm>
+          <a:off x="0" y="0"/>
+          <a:ext cx="0" cy="0"/>
+          <a:chOff x="0" y="0"/>
+          <a:chExt cx="0" cy="0"/>
+        </a:xfrm>
+      </p:grpSpPr>
+      <p:sp>
+        <p:nvSpPr>
+          <p:cNvPr id="4" name="TextBox 3"/>
+          <p:cNvSpPr txBox="1"/>
+          <p:nvPr/>
+        </p:nvSpPr>
+        <p:spPr>
+          <a:xfrm>
+            <a:off x="291544" y="309864"/>
+            <a:ext cx="11669916" cy="6124754"/>
+          </a:xfrm>
+          <a:prstGeom prst="rect">
+            <a:avLst/>
+          </a:prstGeom>
+          <a:noFill/>
+        </p:spPr>
+        <p:txBody>
+          <a:bodyPr wrap="square" rtlCol="0">
+            <a:spAutoFit/>
+          </a:bodyPr>
+          <a:lstStyle/>
+          <a:p>
+            <a:pPr algn="ctr"/>
+            <a:r>
+              <a:rPr lang="en-US" sz="4400" b="1" dirty="0" smtClean="0">
+                <a:latin typeface="Arial" panose="020B0604020202020204" pitchFamily="34" charset="0"/>
+                <a:cs typeface="Arial" panose="020B0604020202020204" pitchFamily="34" charset="0"/>
+              </a:rPr>
+              <a:t>Conclusions</a:t>
+            </a:r>
+          </a:p>
+          <a:p>
+            <a:pPr algn="ctr"/>
+            <a:endParaRPr lang="en-US" sz="4000" dirty="0">
+              <a:latin typeface="Arial" panose="020B0604020202020204" pitchFamily="34" charset="0"/>
+              <a:cs typeface="Arial" panose="020B0604020202020204" pitchFamily="34" charset="0"/>
+            </a:endParaRPr>
+          </a:p>
+          <a:p>
+            <a:pPr algn="ctr"/>
+            <a:r>
+              <a:rPr lang="en-US" sz="3600" u="sng" dirty="0" smtClean="0">
+                <a:latin typeface="Arial" panose="020B0604020202020204" pitchFamily="34" charset="0"/>
+                <a:cs typeface="Arial" panose="020B0604020202020204" pitchFamily="34" charset="0"/>
+              </a:rPr>
+              <a:t>No Advantage for Charter Schools</a:t>
+            </a:r>
+          </a:p>
+          <a:p>
+            <a:pPr algn="ctr"/>
+            <a:r>
+              <a:rPr lang="en-US" sz="2800" dirty="0" smtClean="0">
+                <a:latin typeface="Arial" panose="020B0604020202020204" pitchFamily="34" charset="0"/>
+                <a:cs typeface="Arial" panose="020B0604020202020204" pitchFamily="34" charset="0"/>
+              </a:rPr>
+              <a:t>Global (Across All Schools in Texas)</a:t>
+            </a:r>
+          </a:p>
+          <a:p>
+            <a:pPr algn="ctr"/>
+            <a:r>
+              <a:rPr lang="en-US" sz="2800" dirty="0" smtClean="0">
+                <a:latin typeface="Arial" panose="020B0604020202020204" pitchFamily="34" charset="0"/>
+                <a:cs typeface="Arial" panose="020B0604020202020204" pitchFamily="34" charset="0"/>
+              </a:rPr>
+              <a:t>Demographics</a:t>
+            </a:r>
+          </a:p>
+          <a:p>
+            <a:pPr algn="ctr"/>
+            <a:r>
+              <a:rPr lang="en-US" sz="2800" dirty="0" smtClean="0">
+                <a:latin typeface="Arial" panose="020B0604020202020204" pitchFamily="34" charset="0"/>
+                <a:cs typeface="Arial" panose="020B0604020202020204" pitchFamily="34" charset="0"/>
+              </a:rPr>
+              <a:t>Economically Disadvantaged</a:t>
+            </a:r>
+          </a:p>
+          <a:p>
+            <a:pPr algn="ctr"/>
+            <a:endParaRPr lang="en-US" sz="3600" dirty="0" smtClean="0">
+              <a:latin typeface="Arial" panose="020B0604020202020204" pitchFamily="34" charset="0"/>
+              <a:cs typeface="Arial" panose="020B0604020202020204" pitchFamily="34" charset="0"/>
+            </a:endParaRPr>
+          </a:p>
+          <a:p>
+            <a:pPr algn="ctr"/>
+            <a:r>
+              <a:rPr lang="en-US" sz="3600" u="sng" dirty="0" smtClean="0">
+                <a:latin typeface="Arial" panose="020B0604020202020204" pitchFamily="34" charset="0"/>
+                <a:cs typeface="Arial" panose="020B0604020202020204" pitchFamily="34" charset="0"/>
+              </a:rPr>
+              <a:t>Future Studies</a:t>
+            </a:r>
+          </a:p>
+          <a:p>
+            <a:pPr algn="ctr"/>
+            <a:r>
+              <a:rPr lang="en-US" sz="2800" dirty="0" smtClean="0">
+                <a:latin typeface="Arial" panose="020B0604020202020204" pitchFamily="34" charset="0"/>
+                <a:cs typeface="Arial" panose="020B0604020202020204" pitchFamily="34" charset="0"/>
+              </a:rPr>
+              <a:t>Urban versus Rural Schools</a:t>
+            </a:r>
+          </a:p>
+          <a:p>
+            <a:pPr algn="ctr"/>
+            <a:r>
+              <a:rPr lang="en-US" sz="2800" dirty="0" smtClean="0">
+                <a:latin typeface="Arial" panose="020B0604020202020204" pitchFamily="34" charset="0"/>
+                <a:cs typeface="Arial" panose="020B0604020202020204" pitchFamily="34" charset="0"/>
+              </a:rPr>
+              <a:t>Socioeconomics of Particular Areas versus School Performance</a:t>
+            </a:r>
+          </a:p>
+          <a:p>
+            <a:pPr algn="ctr"/>
+            <a:r>
+              <a:rPr lang="en-US" sz="2800" dirty="0" smtClean="0">
+                <a:latin typeface="Arial" panose="020B0604020202020204" pitchFamily="34" charset="0"/>
+                <a:cs typeface="Arial" panose="020B0604020202020204" pitchFamily="34" charset="0"/>
+              </a:rPr>
+              <a:t>Demographics of Schools versus Demographics of Areas</a:t>
+            </a:r>
+          </a:p>
+          <a:p>
+            <a:pPr algn="ctr"/>
+            <a:r>
+              <a:rPr lang="en-US" sz="2800" dirty="0" smtClean="0">
+                <a:latin typeface="Arial" panose="020B0604020202020204" pitchFamily="34" charset="0"/>
+                <a:cs typeface="Arial" panose="020B0604020202020204" pitchFamily="34" charset="0"/>
+              </a:rPr>
+              <a:t>Performance versus Years and Grades</a:t>
+            </a:r>
+          </a:p>
+        </p:txBody>
+      </p:sp>
+    </p:spTree>
+    <p:extLst>
+      <p:ext uri="{BB962C8B-B14F-4D97-AF65-F5344CB8AC3E}">
+        <p14:creationId xmlns:p14="http://schemas.microsoft.com/office/powerpoint/2010/main" val="2178633144"/>
+      </p:ext>
+    </p:extLst>
+  </p:cSld>
+  <p:clrMapOvr>
+    <a:masterClrMapping/>
+  </p:clrMapOvr>
+</p:sld>
+</file>
+
+<file path=ppt/slides/slide8.xml><?xml version="1.0" encoding="utf-8"?>
 <p:sld xmlns:a="http://schemas.openxmlformats.org/drawingml/2006/main" xmlns:r="http://schemas.openxmlformats.org/officeDocument/2006/relationships" xmlns:p="http://schemas.openxmlformats.org/presentationml/2006/main">
   <p:cSld>
     <p:bg>
@@ -6133,686 +6787,6 @@
       </p:par>
     </p:tnLst>
   </p:timing>
-</p:sld>
-</file>
-
-<file path=ppt/slides/slide3.xml><?xml version="1.0" encoding="utf-8"?>
-<p:sld xmlns:a="http://schemas.openxmlformats.org/drawingml/2006/main" xmlns:r="http://schemas.openxmlformats.org/officeDocument/2006/relationships" xmlns:p="http://schemas.openxmlformats.org/presentationml/2006/main">
-  <p:cSld>
-    <p:spTree>
-      <p:nvGrpSpPr>
-        <p:cNvPr id="1" name=""/>
-        <p:cNvGrpSpPr/>
-        <p:nvPr/>
-      </p:nvGrpSpPr>
-      <p:grpSpPr>
-        <a:xfrm>
-          <a:off x="0" y="0"/>
-          <a:ext cx="0" cy="0"/>
-          <a:chOff x="0" y="0"/>
-          <a:chExt cx="0" cy="0"/>
-        </a:xfrm>
-      </p:grpSpPr>
-      <p:sp>
-        <p:nvSpPr>
-          <p:cNvPr id="5" name="TextBox 4"/>
-          <p:cNvSpPr txBox="1"/>
-          <p:nvPr/>
-        </p:nvSpPr>
-        <p:spPr>
-          <a:xfrm>
-            <a:off x="280658" y="592893"/>
-            <a:ext cx="11669916" cy="5693866"/>
-          </a:xfrm>
-          <a:prstGeom prst="rect">
-            <a:avLst/>
-          </a:prstGeom>
-          <a:noFill/>
-        </p:spPr>
-        <p:txBody>
-          <a:bodyPr wrap="square" rtlCol="0">
-            <a:spAutoFit/>
-          </a:bodyPr>
-          <a:lstStyle/>
-          <a:p>
-            <a:pPr algn="ctr"/>
-            <a:r>
-              <a:rPr lang="en-US" sz="4000" b="1" dirty="0" smtClean="0">
-                <a:latin typeface="Arial" panose="020B0604020202020204" pitchFamily="34" charset="0"/>
-                <a:cs typeface="Arial" panose="020B0604020202020204" pitchFamily="34" charset="0"/>
-              </a:rPr>
-              <a:t>Charter Schools and Education Reform</a:t>
-            </a:r>
-          </a:p>
-          <a:p>
-            <a:pPr algn="ctr"/>
-            <a:endParaRPr lang="en-US" sz="4000" dirty="0">
-              <a:latin typeface="Arial" panose="020B0604020202020204" pitchFamily="34" charset="0"/>
-              <a:cs typeface="Arial" panose="020B0604020202020204" pitchFamily="34" charset="0"/>
-            </a:endParaRPr>
-          </a:p>
-          <a:p>
-            <a:pPr algn="ctr"/>
-            <a:r>
-              <a:rPr lang="en-US" sz="3600" dirty="0" smtClean="0">
-                <a:latin typeface="Arial" panose="020B0604020202020204" pitchFamily="34" charset="0"/>
-                <a:cs typeface="Arial" panose="020B0604020202020204" pitchFamily="34" charset="0"/>
-              </a:rPr>
-              <a:t>Accountability</a:t>
-            </a:r>
-          </a:p>
-          <a:p>
-            <a:pPr algn="ctr"/>
-            <a:r>
-              <a:rPr lang="en-US" sz="2800" dirty="0" smtClean="0">
-                <a:latin typeface="Arial" panose="020B0604020202020204" pitchFamily="34" charset="0"/>
-                <a:cs typeface="Arial" panose="020B0604020202020204" pitchFamily="34" charset="0"/>
-              </a:rPr>
-              <a:t>Rapid evaluation if it doesn’t work.</a:t>
-            </a:r>
-            <a:endParaRPr lang="en-US" sz="2400" dirty="0" smtClean="0">
-              <a:latin typeface="Arial" panose="020B0604020202020204" pitchFamily="34" charset="0"/>
-              <a:cs typeface="Arial" panose="020B0604020202020204" pitchFamily="34" charset="0"/>
-            </a:endParaRPr>
-          </a:p>
-          <a:p>
-            <a:pPr algn="ctr"/>
-            <a:endParaRPr lang="en-US" sz="4000" dirty="0">
-              <a:latin typeface="Arial" panose="020B0604020202020204" pitchFamily="34" charset="0"/>
-              <a:cs typeface="Arial" panose="020B0604020202020204" pitchFamily="34" charset="0"/>
-            </a:endParaRPr>
-          </a:p>
-          <a:p>
-            <a:pPr algn="ctr"/>
-            <a:r>
-              <a:rPr lang="en-US" sz="3600" dirty="0" smtClean="0">
-                <a:latin typeface="Arial" panose="020B0604020202020204" pitchFamily="34" charset="0"/>
-                <a:cs typeface="Arial" panose="020B0604020202020204" pitchFamily="34" charset="0"/>
-              </a:rPr>
-              <a:t>Choice</a:t>
-            </a:r>
-          </a:p>
-          <a:p>
-            <a:pPr algn="ctr"/>
-            <a:r>
-              <a:rPr lang="en-US" sz="2800" dirty="0" smtClean="0">
-                <a:latin typeface="Arial" panose="020B0604020202020204" pitchFamily="34" charset="0"/>
-                <a:cs typeface="Arial" panose="020B0604020202020204" pitchFamily="34" charset="0"/>
-              </a:rPr>
-              <a:t>Parents dictate where to send their children.</a:t>
-            </a:r>
-          </a:p>
-          <a:p>
-            <a:pPr algn="ctr"/>
-            <a:endParaRPr lang="en-US" sz="4000" dirty="0">
-              <a:latin typeface="Arial" panose="020B0604020202020204" pitchFamily="34" charset="0"/>
-              <a:cs typeface="Arial" panose="020B0604020202020204" pitchFamily="34" charset="0"/>
-            </a:endParaRPr>
-          </a:p>
-          <a:p>
-            <a:pPr algn="ctr"/>
-            <a:r>
-              <a:rPr lang="en-US" sz="3600" dirty="0" smtClean="0">
-                <a:latin typeface="Arial" panose="020B0604020202020204" pitchFamily="34" charset="0"/>
-                <a:cs typeface="Arial" panose="020B0604020202020204" pitchFamily="34" charset="0"/>
-              </a:rPr>
-              <a:t>Autonomy</a:t>
-            </a:r>
-          </a:p>
-          <a:p>
-            <a:pPr algn="ctr"/>
-            <a:r>
-              <a:rPr lang="en-US" sz="2800" dirty="0" smtClean="0">
-                <a:latin typeface="Arial" panose="020B0604020202020204" pitchFamily="34" charset="0"/>
-                <a:cs typeface="Arial" panose="020B0604020202020204" pitchFamily="34" charset="0"/>
-              </a:rPr>
-              <a:t>Entrepreneurial and innovative.</a:t>
-            </a:r>
-          </a:p>
-        </p:txBody>
-      </p:sp>
-    </p:spTree>
-    <p:extLst>
-      <p:ext uri="{BB962C8B-B14F-4D97-AF65-F5344CB8AC3E}">
-        <p14:creationId xmlns:p14="http://schemas.microsoft.com/office/powerpoint/2010/main" val="3992222410"/>
-      </p:ext>
-    </p:extLst>
-  </p:cSld>
-  <p:clrMapOvr>
-    <a:masterClrMapping/>
-  </p:clrMapOvr>
-</p:sld>
-</file>
-
-<file path=ppt/slides/slide4.xml><?xml version="1.0" encoding="utf-8"?>
-<p:sld xmlns:a="http://schemas.openxmlformats.org/drawingml/2006/main" xmlns:r="http://schemas.openxmlformats.org/officeDocument/2006/relationships" xmlns:p="http://schemas.openxmlformats.org/presentationml/2006/main">
-  <p:cSld>
-    <p:spTree>
-      <p:nvGrpSpPr>
-        <p:cNvPr id="1" name=""/>
-        <p:cNvGrpSpPr/>
-        <p:nvPr/>
-      </p:nvGrpSpPr>
-      <p:grpSpPr>
-        <a:xfrm>
-          <a:off x="0" y="0"/>
-          <a:ext cx="0" cy="0"/>
-          <a:chOff x="0" y="0"/>
-          <a:chExt cx="0" cy="0"/>
-        </a:xfrm>
-      </p:grpSpPr>
-      <p:sp>
-        <p:nvSpPr>
-          <p:cNvPr id="4" name="TextBox 3"/>
-          <p:cNvSpPr txBox="1"/>
-          <p:nvPr/>
-        </p:nvSpPr>
-        <p:spPr>
-          <a:xfrm>
-            <a:off x="280658" y="440489"/>
-            <a:ext cx="11669916" cy="6186309"/>
-          </a:xfrm>
-          <a:prstGeom prst="rect">
-            <a:avLst/>
-          </a:prstGeom>
-          <a:noFill/>
-        </p:spPr>
-        <p:txBody>
-          <a:bodyPr wrap="square" rtlCol="0">
-            <a:spAutoFit/>
-          </a:bodyPr>
-          <a:lstStyle/>
-          <a:p>
-            <a:pPr algn="ctr"/>
-            <a:r>
-              <a:rPr lang="en-US" sz="4000" b="1" dirty="0" smtClean="0">
-                <a:latin typeface="Arial" panose="020B0604020202020204" pitchFamily="34" charset="0"/>
-                <a:cs typeface="Arial" panose="020B0604020202020204" pitchFamily="34" charset="0"/>
-              </a:rPr>
-              <a:t>But Only if the Schools Work! </a:t>
-            </a:r>
-          </a:p>
-          <a:p>
-            <a:pPr algn="ctr"/>
-            <a:r>
-              <a:rPr lang="en-US" sz="3600" dirty="0" smtClean="0">
-                <a:latin typeface="Arial" panose="020B0604020202020204" pitchFamily="34" charset="0"/>
-                <a:cs typeface="Arial" panose="020B0604020202020204" pitchFamily="34" charset="0"/>
-              </a:rPr>
-              <a:t>The Dataset: 2019 Math STAAR Test</a:t>
-            </a:r>
-          </a:p>
-          <a:p>
-            <a:pPr algn="ctr"/>
-            <a:endParaRPr lang="en-US" sz="4000" dirty="0">
-              <a:latin typeface="Arial" panose="020B0604020202020204" pitchFamily="34" charset="0"/>
-              <a:cs typeface="Arial" panose="020B0604020202020204" pitchFamily="34" charset="0"/>
-            </a:endParaRPr>
-          </a:p>
-          <a:p>
-            <a:pPr algn="ctr"/>
-            <a:r>
-              <a:rPr lang="en-US" sz="2800" dirty="0" smtClean="0">
-                <a:latin typeface="Arial" panose="020B0604020202020204" pitchFamily="34" charset="0"/>
-                <a:cs typeface="Arial" panose="020B0604020202020204" pitchFamily="34" charset="0"/>
-              </a:rPr>
-              <a:t>Texas Assessment of Academic Readiness (STAAR) Test 2019</a:t>
-            </a:r>
-          </a:p>
-          <a:p>
-            <a:pPr algn="ctr"/>
-            <a:endParaRPr lang="en-US" sz="2800" dirty="0">
-              <a:latin typeface="Arial" panose="020B0604020202020204" pitchFamily="34" charset="0"/>
-              <a:cs typeface="Arial" panose="020B0604020202020204" pitchFamily="34" charset="0"/>
-            </a:endParaRPr>
-          </a:p>
-          <a:p>
-            <a:pPr algn="ctr"/>
-            <a:r>
-              <a:rPr lang="en-US" sz="2800" dirty="0" smtClean="0">
-                <a:latin typeface="Arial" panose="020B0604020202020204" pitchFamily="34" charset="0"/>
-                <a:cs typeface="Arial" panose="020B0604020202020204" pitchFamily="34" charset="0"/>
-              </a:rPr>
-              <a:t>Administered to all public schools (ISD and Charter) at the same time and under similar conditions (N&gt;4000 schools)</a:t>
-            </a:r>
-          </a:p>
-          <a:p>
-            <a:pPr algn="ctr"/>
-            <a:endParaRPr lang="en-US" sz="2800" dirty="0" smtClean="0">
-              <a:latin typeface="Arial" panose="020B0604020202020204" pitchFamily="34" charset="0"/>
-              <a:cs typeface="Arial" panose="020B0604020202020204" pitchFamily="34" charset="0"/>
-            </a:endParaRPr>
-          </a:p>
-          <a:p>
-            <a:pPr algn="ctr"/>
-            <a:r>
-              <a:rPr lang="en-US" sz="2800" dirty="0" smtClean="0">
-                <a:latin typeface="Arial" panose="020B0604020202020204" pitchFamily="34" charset="0"/>
-                <a:cs typeface="Arial" panose="020B0604020202020204" pitchFamily="34" charset="0"/>
-              </a:rPr>
-              <a:t>Large dataset (#schools, demographics, geographical, socioeconomic, immigrant status, much more!)</a:t>
-            </a:r>
-          </a:p>
-          <a:p>
-            <a:pPr algn="ctr"/>
-            <a:endParaRPr lang="en-US" sz="2800" dirty="0">
-              <a:latin typeface="Arial" panose="020B0604020202020204" pitchFamily="34" charset="0"/>
-              <a:cs typeface="Arial" panose="020B0604020202020204" pitchFamily="34" charset="0"/>
-            </a:endParaRPr>
-          </a:p>
-          <a:p>
-            <a:pPr algn="ctr"/>
-            <a:r>
-              <a:rPr lang="en-US" sz="3200" b="1" dirty="0" smtClean="0">
-                <a:latin typeface="Arial" panose="020B0604020202020204" pitchFamily="34" charset="0"/>
-                <a:cs typeface="Arial" panose="020B0604020202020204" pitchFamily="34" charset="0"/>
-              </a:rPr>
-              <a:t>CAVEATS: </a:t>
-            </a:r>
-            <a:r>
-              <a:rPr lang="en-US" sz="3200" b="1" dirty="0" smtClean="0">
-                <a:latin typeface="Arial" panose="020B0604020202020204" pitchFamily="34" charset="0"/>
-                <a:cs typeface="Arial" panose="020B0604020202020204" pitchFamily="34" charset="0"/>
-              </a:rPr>
-              <a:t>Only one standardized </a:t>
-            </a:r>
-            <a:r>
-              <a:rPr lang="en-US" sz="3200" b="1" dirty="0" smtClean="0">
-                <a:latin typeface="Arial" panose="020B0604020202020204" pitchFamily="34" charset="0"/>
-                <a:cs typeface="Arial" panose="020B0604020202020204" pitchFamily="34" charset="0"/>
-              </a:rPr>
-              <a:t>test</a:t>
-            </a:r>
-            <a:r>
-              <a:rPr lang="en-US" sz="3200" b="1" dirty="0" smtClean="0">
-                <a:latin typeface="Arial" panose="020B0604020202020204" pitchFamily="34" charset="0"/>
-                <a:cs typeface="Arial" panose="020B0604020202020204" pitchFamily="34" charset="0"/>
-              </a:rPr>
-              <a:t>, Grades 3-5!</a:t>
-            </a:r>
-            <a:r>
-              <a:rPr lang="en-US" sz="3200" b="1" dirty="0" smtClean="0">
-                <a:latin typeface="Arial" panose="020B0604020202020204" pitchFamily="34" charset="0"/>
-                <a:cs typeface="Arial" panose="020B0604020202020204" pitchFamily="34" charset="0"/>
-              </a:rPr>
-              <a:t> </a:t>
-            </a:r>
-            <a:endParaRPr lang="en-US" sz="3200" b="1" dirty="0">
-              <a:latin typeface="Arial" panose="020B0604020202020204" pitchFamily="34" charset="0"/>
-              <a:cs typeface="Arial" panose="020B0604020202020204" pitchFamily="34" charset="0"/>
-            </a:endParaRPr>
-          </a:p>
-          <a:p>
-            <a:pPr algn="ctr"/>
-            <a:endParaRPr lang="en-US" sz="2000" b="1" dirty="0" smtClean="0">
-              <a:latin typeface="Arial" panose="020B0604020202020204" pitchFamily="34" charset="0"/>
-              <a:cs typeface="Arial" panose="020B0604020202020204" pitchFamily="34" charset="0"/>
-            </a:endParaRPr>
-          </a:p>
-        </p:txBody>
-      </p:sp>
-    </p:spTree>
-    <p:extLst>
-      <p:ext uri="{BB962C8B-B14F-4D97-AF65-F5344CB8AC3E}">
-        <p14:creationId xmlns:p14="http://schemas.microsoft.com/office/powerpoint/2010/main" val="3215726998"/>
-      </p:ext>
-    </p:extLst>
-  </p:cSld>
-  <p:clrMapOvr>
-    <a:masterClrMapping/>
-  </p:clrMapOvr>
-</p:sld>
-</file>
-
-<file path=ppt/slides/slide5.xml><?xml version="1.0" encoding="utf-8"?>
-<p:sld xmlns:a="http://schemas.openxmlformats.org/drawingml/2006/main" xmlns:r="http://schemas.openxmlformats.org/officeDocument/2006/relationships" xmlns:p="http://schemas.openxmlformats.org/presentationml/2006/main">
-  <p:cSld>
-    <p:spTree>
-      <p:nvGrpSpPr>
-        <p:cNvPr id="1" name=""/>
-        <p:cNvGrpSpPr/>
-        <p:nvPr/>
-      </p:nvGrpSpPr>
-      <p:grpSpPr>
-        <a:xfrm>
-          <a:off x="0" y="0"/>
-          <a:ext cx="0" cy="0"/>
-          <a:chOff x="0" y="0"/>
-          <a:chExt cx="0" cy="0"/>
-        </a:xfrm>
-      </p:grpSpPr>
-      <p:pic>
-        <p:nvPicPr>
-          <p:cNvPr id="9" name="Picture 8"/>
-          <p:cNvPicPr>
-            <a:picLocks noChangeAspect="1"/>
-          </p:cNvPicPr>
-          <p:nvPr/>
-        </p:nvPicPr>
-        <p:blipFill>
-          <a:blip r:embed="rId2" cstate="print">
-            <a:extLst>
-              <a:ext uri="{28A0092B-C50C-407E-A947-70E740481C1C}">
-                <a14:useLocalDpi xmlns:a14="http://schemas.microsoft.com/office/drawing/2010/main" val="0"/>
-              </a:ext>
-            </a:extLst>
-          </a:blip>
-          <a:stretch>
-            <a:fillRect/>
-          </a:stretch>
-        </p:blipFill>
-        <p:spPr>
-          <a:xfrm>
-            <a:off x="1453667" y="315685"/>
-            <a:ext cx="9313168" cy="6361173"/>
-          </a:xfrm>
-          <a:prstGeom prst="rect">
-            <a:avLst/>
-          </a:prstGeom>
-          <a:blipFill dpi="0" rotWithShape="1">
-            <a:blip r:embed="rId3"/>
-            <a:srcRect/>
-            <a:tile tx="0" ty="0" sx="100000" sy="100000" flip="none" algn="tl"/>
-          </a:blipFill>
-        </p:spPr>
-      </p:pic>
-    </p:spTree>
-    <p:extLst>
-      <p:ext uri="{BB962C8B-B14F-4D97-AF65-F5344CB8AC3E}">
-        <p14:creationId xmlns:p14="http://schemas.microsoft.com/office/powerpoint/2010/main" val="3110368016"/>
-      </p:ext>
-    </p:extLst>
-  </p:cSld>
-  <p:clrMapOvr>
-    <a:masterClrMapping/>
-  </p:clrMapOvr>
-</p:sld>
-</file>
-
-<file path=ppt/slides/slide6.xml><?xml version="1.0" encoding="utf-8"?>
-<p:sld xmlns:a="http://schemas.openxmlformats.org/drawingml/2006/main" xmlns:r="http://schemas.openxmlformats.org/officeDocument/2006/relationships" xmlns:p="http://schemas.openxmlformats.org/presentationml/2006/main">
-  <p:cSld>
-    <p:spTree>
-      <p:nvGrpSpPr>
-        <p:cNvPr id="1" name=""/>
-        <p:cNvGrpSpPr/>
-        <p:nvPr/>
-      </p:nvGrpSpPr>
-      <p:grpSpPr>
-        <a:xfrm>
-          <a:off x="0" y="0"/>
-          <a:ext cx="0" cy="0"/>
-          <a:chOff x="0" y="0"/>
-          <a:chExt cx="0" cy="0"/>
-        </a:xfrm>
-      </p:grpSpPr>
-      <p:pic>
-        <p:nvPicPr>
-          <p:cNvPr id="4" name="Picture 3"/>
-          <p:cNvPicPr>
-            <a:picLocks noChangeAspect="1"/>
-          </p:cNvPicPr>
-          <p:nvPr/>
-        </p:nvPicPr>
-        <p:blipFill>
-          <a:blip r:embed="rId2" cstate="print">
-            <a:extLst>
-              <a:ext uri="{28A0092B-C50C-407E-A947-70E740481C1C}">
-                <a14:useLocalDpi xmlns:a14="http://schemas.microsoft.com/office/drawing/2010/main" val="0"/>
-              </a:ext>
-            </a:extLst>
-          </a:blip>
-          <a:stretch>
-            <a:fillRect/>
-          </a:stretch>
-        </p:blipFill>
-        <p:spPr>
-          <a:xfrm>
-            <a:off x="1328048" y="500738"/>
-            <a:ext cx="9525009" cy="5936348"/>
-          </a:xfrm>
-          <a:prstGeom prst="rect">
-            <a:avLst/>
-          </a:prstGeom>
-        </p:spPr>
-      </p:pic>
-    </p:spTree>
-    <p:extLst>
-      <p:ext uri="{BB962C8B-B14F-4D97-AF65-F5344CB8AC3E}">
-        <p14:creationId xmlns:p14="http://schemas.microsoft.com/office/powerpoint/2010/main" val="1900293336"/>
-      </p:ext>
-    </p:extLst>
-  </p:cSld>
-  <p:clrMapOvr>
-    <a:masterClrMapping/>
-  </p:clrMapOvr>
-</p:sld>
-</file>
-
-<file path=ppt/slides/slide7.xml><?xml version="1.0" encoding="utf-8"?>
-<p:sld xmlns:a="http://schemas.openxmlformats.org/drawingml/2006/main" xmlns:r="http://schemas.openxmlformats.org/officeDocument/2006/relationships" xmlns:p="http://schemas.openxmlformats.org/presentationml/2006/main">
-  <p:cSld>
-    <p:spTree>
-      <p:nvGrpSpPr>
-        <p:cNvPr id="1" name=""/>
-        <p:cNvGrpSpPr/>
-        <p:nvPr/>
-      </p:nvGrpSpPr>
-      <p:grpSpPr>
-        <a:xfrm>
-          <a:off x="0" y="0"/>
-          <a:ext cx="0" cy="0"/>
-          <a:chOff x="0" y="0"/>
-          <a:chExt cx="0" cy="0"/>
-        </a:xfrm>
-      </p:grpSpPr>
-      <p:pic>
-        <p:nvPicPr>
-          <p:cNvPr id="4" name="Picture 3"/>
-          <p:cNvPicPr>
-            <a:picLocks noChangeAspect="1"/>
-          </p:cNvPicPr>
-          <p:nvPr/>
-        </p:nvPicPr>
-        <p:blipFill>
-          <a:blip r:embed="rId2" cstate="print">
-            <a:extLst>
-              <a:ext uri="{28A0092B-C50C-407E-A947-70E740481C1C}">
-                <a14:useLocalDpi xmlns:a14="http://schemas.microsoft.com/office/drawing/2010/main" val="0"/>
-              </a:ext>
-            </a:extLst>
-          </a:blip>
-          <a:stretch>
-            <a:fillRect/>
-          </a:stretch>
-        </p:blipFill>
-        <p:spPr>
-          <a:xfrm>
-            <a:off x="1709058" y="584201"/>
-            <a:ext cx="8773894" cy="5849262"/>
-          </a:xfrm>
-          <a:prstGeom prst="rect">
-            <a:avLst/>
-          </a:prstGeom>
-        </p:spPr>
-      </p:pic>
-    </p:spTree>
-    <p:extLst>
-      <p:ext uri="{BB962C8B-B14F-4D97-AF65-F5344CB8AC3E}">
-        <p14:creationId xmlns:p14="http://schemas.microsoft.com/office/powerpoint/2010/main" val="342704038"/>
-      </p:ext>
-    </p:extLst>
-  </p:cSld>
-  <p:clrMapOvr>
-    <a:masterClrMapping/>
-  </p:clrMapOvr>
-</p:sld>
-</file>
-
-<file path=ppt/slides/slide8.xml><?xml version="1.0" encoding="utf-8"?>
-<p:sld xmlns:a="http://schemas.openxmlformats.org/drawingml/2006/main" xmlns:r="http://schemas.openxmlformats.org/officeDocument/2006/relationships" xmlns:p="http://schemas.openxmlformats.org/presentationml/2006/main">
-  <p:cSld>
-    <p:spTree>
-      <p:nvGrpSpPr>
-        <p:cNvPr id="1" name=""/>
-        <p:cNvGrpSpPr/>
-        <p:nvPr/>
-      </p:nvGrpSpPr>
-      <p:grpSpPr>
-        <a:xfrm>
-          <a:off x="0" y="0"/>
-          <a:ext cx="0" cy="0"/>
-          <a:chOff x="0" y="0"/>
-          <a:chExt cx="0" cy="0"/>
-        </a:xfrm>
-      </p:grpSpPr>
-      <p:sp>
-        <p:nvSpPr>
-          <p:cNvPr id="4" name="TextBox 3"/>
-          <p:cNvSpPr txBox="1"/>
-          <p:nvPr/>
-        </p:nvSpPr>
-        <p:spPr>
-          <a:xfrm>
-            <a:off x="291544" y="309864"/>
-            <a:ext cx="11669916" cy="6124754"/>
-          </a:xfrm>
-          <a:prstGeom prst="rect">
-            <a:avLst/>
-          </a:prstGeom>
-          <a:noFill/>
-        </p:spPr>
-        <p:txBody>
-          <a:bodyPr wrap="square" rtlCol="0">
-            <a:spAutoFit/>
-          </a:bodyPr>
-          <a:lstStyle/>
-          <a:p>
-            <a:pPr algn="ctr"/>
-            <a:r>
-              <a:rPr lang="en-US" sz="4000" b="1" dirty="0" smtClean="0">
-                <a:latin typeface="Arial" panose="020B0604020202020204" pitchFamily="34" charset="0"/>
-                <a:cs typeface="Arial" panose="020B0604020202020204" pitchFamily="34" charset="0"/>
-              </a:rPr>
-              <a:t>Conclusions</a:t>
-            </a:r>
-          </a:p>
-          <a:p>
-            <a:pPr algn="ctr"/>
-            <a:endParaRPr lang="en-US" sz="4000" dirty="0">
-              <a:latin typeface="Arial" panose="020B0604020202020204" pitchFamily="34" charset="0"/>
-              <a:cs typeface="Arial" panose="020B0604020202020204" pitchFamily="34" charset="0"/>
-            </a:endParaRPr>
-          </a:p>
-          <a:p>
-            <a:pPr algn="ctr"/>
-            <a:r>
-              <a:rPr lang="en-US" sz="4000" dirty="0" smtClean="0">
-                <a:latin typeface="Arial" panose="020B0604020202020204" pitchFamily="34" charset="0"/>
-                <a:cs typeface="Arial" panose="020B0604020202020204" pitchFamily="34" charset="0"/>
-              </a:rPr>
-              <a:t>No Advantage for Charter Schools</a:t>
-            </a:r>
-          </a:p>
-          <a:p>
-            <a:pPr algn="ctr"/>
-            <a:r>
-              <a:rPr lang="en-US" sz="2800" dirty="0" smtClean="0">
-                <a:latin typeface="Arial" panose="020B0604020202020204" pitchFamily="34" charset="0"/>
-                <a:cs typeface="Arial" panose="020B0604020202020204" pitchFamily="34" charset="0"/>
-              </a:rPr>
-              <a:t>Global (Across All Schools in Texas)</a:t>
-            </a:r>
-          </a:p>
-          <a:p>
-            <a:pPr algn="ctr"/>
-            <a:r>
-              <a:rPr lang="en-US" sz="2800" dirty="0" smtClean="0">
-                <a:latin typeface="Arial" panose="020B0604020202020204" pitchFamily="34" charset="0"/>
-                <a:cs typeface="Arial" panose="020B0604020202020204" pitchFamily="34" charset="0"/>
-              </a:rPr>
-              <a:t>Demographics</a:t>
-            </a:r>
-          </a:p>
-          <a:p>
-            <a:pPr algn="ctr"/>
-            <a:r>
-              <a:rPr lang="en-US" sz="2800" dirty="0" smtClean="0">
-                <a:latin typeface="Arial" panose="020B0604020202020204" pitchFamily="34" charset="0"/>
-                <a:cs typeface="Arial" panose="020B0604020202020204" pitchFamily="34" charset="0"/>
-              </a:rPr>
-              <a:t>Economically Disadvantaged</a:t>
-            </a:r>
-          </a:p>
-          <a:p>
-            <a:pPr algn="ctr"/>
-            <a:endParaRPr lang="en-US" sz="3600" dirty="0" smtClean="0">
-              <a:latin typeface="Arial" panose="020B0604020202020204" pitchFamily="34" charset="0"/>
-              <a:cs typeface="Arial" panose="020B0604020202020204" pitchFamily="34" charset="0"/>
-            </a:endParaRPr>
-          </a:p>
-          <a:p>
-            <a:pPr algn="ctr"/>
-            <a:r>
-              <a:rPr lang="en-US" sz="4000" dirty="0" smtClean="0">
-                <a:latin typeface="Arial" panose="020B0604020202020204" pitchFamily="34" charset="0"/>
-                <a:cs typeface="Arial" panose="020B0604020202020204" pitchFamily="34" charset="0"/>
-              </a:rPr>
-              <a:t>Future Studies</a:t>
-            </a:r>
-          </a:p>
-          <a:p>
-            <a:pPr algn="ctr"/>
-            <a:r>
-              <a:rPr lang="en-US" sz="2800" dirty="0" smtClean="0">
-                <a:latin typeface="Arial" panose="020B0604020202020204" pitchFamily="34" charset="0"/>
-                <a:cs typeface="Arial" panose="020B0604020202020204" pitchFamily="34" charset="0"/>
-              </a:rPr>
-              <a:t>Urban versus Rural Schools</a:t>
-            </a:r>
-          </a:p>
-          <a:p>
-            <a:pPr algn="ctr"/>
-            <a:r>
-              <a:rPr lang="en-US" sz="2800" dirty="0" smtClean="0">
-                <a:latin typeface="Arial" panose="020B0604020202020204" pitchFamily="34" charset="0"/>
-                <a:cs typeface="Arial" panose="020B0604020202020204" pitchFamily="34" charset="0"/>
-              </a:rPr>
-              <a:t>Socioeconomics of Particular Areas versus School Performance</a:t>
-            </a:r>
-          </a:p>
-          <a:p>
-            <a:pPr algn="ctr"/>
-            <a:r>
-              <a:rPr lang="en-US" sz="2800" dirty="0" smtClean="0">
-                <a:latin typeface="Arial" panose="020B0604020202020204" pitchFamily="34" charset="0"/>
-                <a:cs typeface="Arial" panose="020B0604020202020204" pitchFamily="34" charset="0"/>
-              </a:rPr>
-              <a:t>Demographics of Schools versus Demographics of Areas</a:t>
-            </a:r>
-          </a:p>
-          <a:p>
-            <a:pPr algn="ctr"/>
-            <a:r>
-              <a:rPr lang="en-US" sz="2800" dirty="0" smtClean="0">
-                <a:latin typeface="Arial" panose="020B0604020202020204" pitchFamily="34" charset="0"/>
-                <a:cs typeface="Arial" panose="020B0604020202020204" pitchFamily="34" charset="0"/>
-              </a:rPr>
-              <a:t>Performance versus Years</a:t>
-            </a:r>
-          </a:p>
-        </p:txBody>
-      </p:sp>
-    </p:spTree>
-    <p:extLst>
-      <p:ext uri="{BB962C8B-B14F-4D97-AF65-F5344CB8AC3E}">
-        <p14:creationId xmlns:p14="http://schemas.microsoft.com/office/powerpoint/2010/main" val="2178633144"/>
-      </p:ext>
-    </p:extLst>
-  </p:cSld>
-  <p:clrMapOvr>
-    <a:masterClrMapping/>
-  </p:clrMapOvr>
 </p:sld>
 </file>
 

</xml_diff>